<commit_message>
Updating for more coverage
made changes for the up coming Nor-Cal Posh User Group in Folsom, Ca
</commit_message>
<xml_diff>
--- a/src/Parallel and Async Scripting.pptx
+++ b/src/Parallel and Async Scripting.pptx
@@ -178,7 +178,7 @@
           <a:noFill/>
           <a:extLst>
             <a:ext uri="{909E8E84-426E-40dd-AFC4-6F175D3DCCD1}">
-              <a14:hiddenFill xmlns="" xmlns:a14="http://schemas.microsoft.com/office/drawing/2010/main">
+              <a14:hiddenFill xmlns:a14="http://schemas.microsoft.com/office/drawing/2010/main" xmlns="">
                 <a:solidFill>
                   <a:srgbClr val="FFFFFF"/>
                 </a:solidFill>
@@ -237,7 +237,7 @@
             </a:ln>
             <a:extLst>
               <a:ext uri="{91240B29-F687-4f45-9708-019B960494DF}">
-                <a14:hiddenLine xmlns="" xmlns:a14="http://schemas.microsoft.com/office/drawing/2010/main" w="9525">
+                <a14:hiddenLine xmlns:a14="http://schemas.microsoft.com/office/drawing/2010/main" xmlns="" w="9525">
                   <a:solidFill>
                     <a:srgbClr val="000000"/>
                   </a:solidFill>
@@ -327,7 +327,7 @@
             </a:ln>
             <a:extLst>
               <a:ext uri="{91240B29-F687-4f45-9708-019B960494DF}">
-                <a14:hiddenLine xmlns="" xmlns:a14="http://schemas.microsoft.com/office/drawing/2010/main" w="9525">
+                <a14:hiddenLine xmlns:a14="http://schemas.microsoft.com/office/drawing/2010/main" xmlns="" w="9525">
                   <a:solidFill>
                     <a:srgbClr val="000000"/>
                   </a:solidFill>
@@ -417,7 +417,7 @@
             </a:ln>
             <a:extLst>
               <a:ext uri="{91240B29-F687-4f45-9708-019B960494DF}">
-                <a14:hiddenLine xmlns="" xmlns:a14="http://schemas.microsoft.com/office/drawing/2010/main" w="9525">
+                <a14:hiddenLine xmlns:a14="http://schemas.microsoft.com/office/drawing/2010/main" xmlns="" w="9525">
                   <a:solidFill>
                     <a:srgbClr val="000000"/>
                   </a:solidFill>
@@ -451,7 +451,7 @@
             </a:ln>
             <a:extLst>
               <a:ext uri="{91240B29-F687-4f45-9708-019B960494DF}">
-                <a14:hiddenLine xmlns="" xmlns:a14="http://schemas.microsoft.com/office/drawing/2010/main" w="9525">
+                <a14:hiddenLine xmlns:a14="http://schemas.microsoft.com/office/drawing/2010/main" xmlns="" w="9525">
                   <a:solidFill>
                     <a:srgbClr val="000000"/>
                   </a:solidFill>
@@ -541,7 +541,7 @@
             </a:ln>
             <a:extLst>
               <a:ext uri="{91240B29-F687-4f45-9708-019B960494DF}">
-                <a14:hiddenLine xmlns="" xmlns:a14="http://schemas.microsoft.com/office/drawing/2010/main" w="9525">
+                <a14:hiddenLine xmlns:a14="http://schemas.microsoft.com/office/drawing/2010/main" xmlns="" w="9525">
                   <a:solidFill>
                     <a:srgbClr val="000000"/>
                   </a:solidFill>
@@ -603,7 +603,7 @@
             </a:ln>
             <a:extLst>
               <a:ext uri="{91240B29-F687-4f45-9708-019B960494DF}">
-                <a14:hiddenLine xmlns="" xmlns:a14="http://schemas.microsoft.com/office/drawing/2010/main" w="9525">
+                <a14:hiddenLine xmlns:a14="http://schemas.microsoft.com/office/drawing/2010/main" xmlns="" w="9525">
                   <a:solidFill>
                     <a:srgbClr val="000000"/>
                   </a:solidFill>
@@ -665,7 +665,7 @@
             </a:ln>
             <a:extLst>
               <a:ext uri="{91240B29-F687-4f45-9708-019B960494DF}">
-                <a14:hiddenLine xmlns="" xmlns:a14="http://schemas.microsoft.com/office/drawing/2010/main" w="9525">
+                <a14:hiddenLine xmlns:a14="http://schemas.microsoft.com/office/drawing/2010/main" xmlns="" w="9525">
                   <a:solidFill>
                     <a:srgbClr val="000000"/>
                   </a:solidFill>
@@ -755,7 +755,7 @@
             </a:ln>
             <a:extLst>
               <a:ext uri="{91240B29-F687-4f45-9708-019B960494DF}">
-                <a14:hiddenLine xmlns="" xmlns:a14="http://schemas.microsoft.com/office/drawing/2010/main" w="9525">
+                <a14:hiddenLine xmlns:a14="http://schemas.microsoft.com/office/drawing/2010/main" xmlns="" w="9525">
                   <a:solidFill>
                     <a:srgbClr val="000000"/>
                   </a:solidFill>
@@ -817,7 +817,7 @@
             </a:ln>
             <a:extLst>
               <a:ext uri="{91240B29-F687-4f45-9708-019B960494DF}">
-                <a14:hiddenLine xmlns="" xmlns:a14="http://schemas.microsoft.com/office/drawing/2010/main" w="9525">
+                <a14:hiddenLine xmlns:a14="http://schemas.microsoft.com/office/drawing/2010/main" xmlns="" w="9525">
                   <a:solidFill>
                     <a:srgbClr val="000000"/>
                   </a:solidFill>
@@ -879,7 +879,7 @@
             </a:ln>
             <a:extLst>
               <a:ext uri="{91240B29-F687-4f45-9708-019B960494DF}">
-                <a14:hiddenLine xmlns="" xmlns:a14="http://schemas.microsoft.com/office/drawing/2010/main" w="9525">
+                <a14:hiddenLine xmlns:a14="http://schemas.microsoft.com/office/drawing/2010/main" xmlns="" w="9525">
                   <a:solidFill>
                     <a:srgbClr val="000000"/>
                   </a:solidFill>
@@ -969,7 +969,7 @@
             </a:ln>
             <a:extLst>
               <a:ext uri="{91240B29-F687-4f45-9708-019B960494DF}">
-                <a14:hiddenLine xmlns="" xmlns:a14="http://schemas.microsoft.com/office/drawing/2010/main" w="9525">
+                <a14:hiddenLine xmlns:a14="http://schemas.microsoft.com/office/drawing/2010/main" xmlns="" w="9525">
                   <a:solidFill>
                     <a:srgbClr val="000000"/>
                   </a:solidFill>
@@ -1059,7 +1059,7 @@
             </a:ln>
             <a:extLst>
               <a:ext uri="{91240B29-F687-4f45-9708-019B960494DF}">
-                <a14:hiddenLine xmlns="" xmlns:a14="http://schemas.microsoft.com/office/drawing/2010/main" w="9525">
+                <a14:hiddenLine xmlns:a14="http://schemas.microsoft.com/office/drawing/2010/main" xmlns="" w="9525">
                   <a:solidFill>
                     <a:srgbClr val="000000"/>
                   </a:solidFill>
@@ -1121,7 +1121,7 @@
             </a:ln>
             <a:extLst>
               <a:ext uri="{91240B29-F687-4f45-9708-019B960494DF}">
-                <a14:hiddenLine xmlns="" xmlns:a14="http://schemas.microsoft.com/office/drawing/2010/main" w="9525">
+                <a14:hiddenLine xmlns:a14="http://schemas.microsoft.com/office/drawing/2010/main" xmlns="" w="9525">
                   <a:solidFill>
                     <a:srgbClr val="000000"/>
                   </a:solidFill>
@@ -1231,7 +1231,7 @@
             </a:ln>
             <a:extLst>
               <a:ext uri="{91240B29-F687-4f45-9708-019B960494DF}">
-                <a14:hiddenLine xmlns="" xmlns:a14="http://schemas.microsoft.com/office/drawing/2010/main" w="9525">
+                <a14:hiddenLine xmlns:a14="http://schemas.microsoft.com/office/drawing/2010/main" xmlns="" w="9525">
                   <a:solidFill>
                     <a:srgbClr val="000000"/>
                   </a:solidFill>
@@ -1293,7 +1293,7 @@
             </a:ln>
             <a:extLst>
               <a:ext uri="{91240B29-F687-4f45-9708-019B960494DF}">
-                <a14:hiddenLine xmlns="" xmlns:a14="http://schemas.microsoft.com/office/drawing/2010/main" w="9525">
+                <a14:hiddenLine xmlns:a14="http://schemas.microsoft.com/office/drawing/2010/main" xmlns="" w="9525">
                   <a:solidFill>
                     <a:srgbClr val="000000"/>
                   </a:solidFill>
@@ -1383,7 +1383,7 @@
             </a:ln>
             <a:extLst>
               <a:ext uri="{91240B29-F687-4f45-9708-019B960494DF}">
-                <a14:hiddenLine xmlns="" xmlns:a14="http://schemas.microsoft.com/office/drawing/2010/main" w="9525">
+                <a14:hiddenLine xmlns:a14="http://schemas.microsoft.com/office/drawing/2010/main" xmlns="" w="9525">
                   <a:solidFill>
                     <a:srgbClr val="000000"/>
                   </a:solidFill>
@@ -1473,7 +1473,7 @@
             </a:ln>
             <a:extLst>
               <a:ext uri="{91240B29-F687-4f45-9708-019B960494DF}">
-                <a14:hiddenLine xmlns="" xmlns:a14="http://schemas.microsoft.com/office/drawing/2010/main" w="9525">
+                <a14:hiddenLine xmlns:a14="http://schemas.microsoft.com/office/drawing/2010/main" xmlns="" w="9525">
                   <a:solidFill>
                     <a:srgbClr val="000000"/>
                   </a:solidFill>
@@ -1535,7 +1535,7 @@
             </a:ln>
             <a:extLst>
               <a:ext uri="{91240B29-F687-4f45-9708-019B960494DF}">
-                <a14:hiddenLine xmlns="" xmlns:a14="http://schemas.microsoft.com/office/drawing/2010/main" w="9525">
+                <a14:hiddenLine xmlns:a14="http://schemas.microsoft.com/office/drawing/2010/main" xmlns="" w="9525">
                   <a:solidFill>
                     <a:srgbClr val="000000"/>
                   </a:solidFill>
@@ -1625,7 +1625,7 @@
             </a:ln>
             <a:extLst>
               <a:ext uri="{91240B29-F687-4f45-9708-019B960494DF}">
-                <a14:hiddenLine xmlns="" xmlns:a14="http://schemas.microsoft.com/office/drawing/2010/main" w="9525">
+                <a14:hiddenLine xmlns:a14="http://schemas.microsoft.com/office/drawing/2010/main" xmlns="" w="9525">
                   <a:solidFill>
                     <a:srgbClr val="000000"/>
                   </a:solidFill>
@@ -1715,7 +1715,7 @@
             </a:ln>
             <a:extLst>
               <a:ext uri="{91240B29-F687-4f45-9708-019B960494DF}">
-                <a14:hiddenLine xmlns="" xmlns:a14="http://schemas.microsoft.com/office/drawing/2010/main" w="9525">
+                <a14:hiddenLine xmlns:a14="http://schemas.microsoft.com/office/drawing/2010/main" xmlns="" w="9525">
                   <a:solidFill>
                     <a:srgbClr val="000000"/>
                   </a:solidFill>
@@ -1771,7 +1771,7 @@
             </a:ln>
             <a:extLst>
               <a:ext uri="{91240B29-F687-4f45-9708-019B960494DF}">
-                <a14:hiddenLine xmlns="" xmlns:a14="http://schemas.microsoft.com/office/drawing/2010/main" w="9525">
+                <a14:hiddenLine xmlns:a14="http://schemas.microsoft.com/office/drawing/2010/main" xmlns="" w="9525">
                   <a:solidFill>
                     <a:srgbClr val="000000"/>
                   </a:solidFill>
@@ -1861,7 +1861,7 @@
             </a:ln>
             <a:extLst>
               <a:ext uri="{91240B29-F687-4f45-9708-019B960494DF}">
-                <a14:hiddenLine xmlns="" xmlns:a14="http://schemas.microsoft.com/office/drawing/2010/main" w="9525">
+                <a14:hiddenLine xmlns:a14="http://schemas.microsoft.com/office/drawing/2010/main" xmlns="" w="9525">
                   <a:solidFill>
                     <a:srgbClr val="000000"/>
                   </a:solidFill>
@@ -1917,7 +1917,7 @@
             </a:ln>
             <a:extLst>
               <a:ext uri="{91240B29-F687-4f45-9708-019B960494DF}">
-                <a14:hiddenLine xmlns="" xmlns:a14="http://schemas.microsoft.com/office/drawing/2010/main" w="9525">
+                <a14:hiddenLine xmlns:a14="http://schemas.microsoft.com/office/drawing/2010/main" xmlns="" w="9525">
                   <a:solidFill>
                     <a:srgbClr val="000000"/>
                   </a:solidFill>
@@ -2007,7 +2007,7 @@
             </a:ln>
             <a:extLst>
               <a:ext uri="{91240B29-F687-4f45-9708-019B960494DF}">
-                <a14:hiddenLine xmlns="" xmlns:a14="http://schemas.microsoft.com/office/drawing/2010/main" w="9525">
+                <a14:hiddenLine xmlns:a14="http://schemas.microsoft.com/office/drawing/2010/main" xmlns="" w="9525">
                   <a:solidFill>
                     <a:srgbClr val="000000"/>
                   </a:solidFill>
@@ -2075,7 +2075,7 @@
             </a:ln>
             <a:extLst>
               <a:ext uri="{91240B29-F687-4f45-9708-019B960494DF}">
-                <a14:hiddenLine xmlns="" xmlns:a14="http://schemas.microsoft.com/office/drawing/2010/main" w="9525">
+                <a14:hiddenLine xmlns:a14="http://schemas.microsoft.com/office/drawing/2010/main" xmlns="" w="9525">
                   <a:solidFill>
                     <a:srgbClr val="000000"/>
                   </a:solidFill>
@@ -2165,7 +2165,7 @@
             </a:ln>
             <a:extLst>
               <a:ext uri="{91240B29-F687-4f45-9708-019B960494DF}">
-                <a14:hiddenLine xmlns="" xmlns:a14="http://schemas.microsoft.com/office/drawing/2010/main" w="9525">
+                <a14:hiddenLine xmlns:a14="http://schemas.microsoft.com/office/drawing/2010/main" xmlns="" w="9525">
                   <a:solidFill>
                     <a:srgbClr val="000000"/>
                   </a:solidFill>
@@ -2233,7 +2233,7 @@
             </a:ln>
             <a:extLst>
               <a:ext uri="{91240B29-F687-4f45-9708-019B960494DF}">
-                <a14:hiddenLine xmlns="" xmlns:a14="http://schemas.microsoft.com/office/drawing/2010/main" w="9525">
+                <a14:hiddenLine xmlns:a14="http://schemas.microsoft.com/office/drawing/2010/main" xmlns="" w="9525">
                   <a:solidFill>
                     <a:srgbClr val="000000"/>
                   </a:solidFill>
@@ -2323,7 +2323,7 @@
             </a:ln>
             <a:extLst>
               <a:ext uri="{91240B29-F687-4f45-9708-019B960494DF}">
-                <a14:hiddenLine xmlns="" xmlns:a14="http://schemas.microsoft.com/office/drawing/2010/main" w="9525">
+                <a14:hiddenLine xmlns:a14="http://schemas.microsoft.com/office/drawing/2010/main" xmlns="" w="9525">
                   <a:solidFill>
                     <a:srgbClr val="000000"/>
                   </a:solidFill>
@@ -2357,7 +2357,7 @@
             </a:ln>
             <a:extLst>
               <a:ext uri="{91240B29-F687-4f45-9708-019B960494DF}">
-                <a14:hiddenLine xmlns="" xmlns:a14="http://schemas.microsoft.com/office/drawing/2010/main" w="9525">
+                <a14:hiddenLine xmlns:a14="http://schemas.microsoft.com/office/drawing/2010/main" xmlns="" w="9525">
                   <a:solidFill>
                     <a:srgbClr val="000000"/>
                   </a:solidFill>
@@ -2447,7 +2447,7 @@
             </a:ln>
             <a:extLst>
               <a:ext uri="{91240B29-F687-4f45-9708-019B960494DF}">
-                <a14:hiddenLine xmlns="" xmlns:a14="http://schemas.microsoft.com/office/drawing/2010/main" w="9525">
+                <a14:hiddenLine xmlns:a14="http://schemas.microsoft.com/office/drawing/2010/main" xmlns="" w="9525">
                   <a:solidFill>
                     <a:srgbClr val="000000"/>
                   </a:solidFill>
@@ -2509,7 +2509,7 @@
             </a:ln>
             <a:extLst>
               <a:ext uri="{91240B29-F687-4f45-9708-019B960494DF}">
-                <a14:hiddenLine xmlns="" xmlns:a14="http://schemas.microsoft.com/office/drawing/2010/main" w="9525">
+                <a14:hiddenLine xmlns:a14="http://schemas.microsoft.com/office/drawing/2010/main" xmlns="" w="9525">
                   <a:solidFill>
                     <a:srgbClr val="000000"/>
                   </a:solidFill>
@@ -2571,7 +2571,7 @@
             </a:ln>
             <a:extLst>
               <a:ext uri="{91240B29-F687-4f45-9708-019B960494DF}">
-                <a14:hiddenLine xmlns="" xmlns:a14="http://schemas.microsoft.com/office/drawing/2010/main" w="9525">
+                <a14:hiddenLine xmlns:a14="http://schemas.microsoft.com/office/drawing/2010/main" xmlns="" w="9525">
                   <a:solidFill>
                     <a:srgbClr val="000000"/>
                   </a:solidFill>
@@ -2661,7 +2661,7 @@
             </a:ln>
             <a:extLst>
               <a:ext uri="{91240B29-F687-4f45-9708-019B960494DF}">
-                <a14:hiddenLine xmlns="" xmlns:a14="http://schemas.microsoft.com/office/drawing/2010/main" w="9525">
+                <a14:hiddenLine xmlns:a14="http://schemas.microsoft.com/office/drawing/2010/main" xmlns="" w="9525">
                   <a:solidFill>
                     <a:srgbClr val="000000"/>
                   </a:solidFill>
@@ -2729,7 +2729,7 @@
             </a:ln>
             <a:extLst>
               <a:ext uri="{91240B29-F687-4f45-9708-019B960494DF}">
-                <a14:hiddenLine xmlns="" xmlns:a14="http://schemas.microsoft.com/office/drawing/2010/main" w="9525">
+                <a14:hiddenLine xmlns:a14="http://schemas.microsoft.com/office/drawing/2010/main" xmlns="" w="9525">
                   <a:solidFill>
                     <a:srgbClr val="000000"/>
                   </a:solidFill>
@@ -2791,7 +2791,7 @@
             </a:ln>
             <a:extLst>
               <a:ext uri="{91240B29-F687-4f45-9708-019B960494DF}">
-                <a14:hiddenLine xmlns="" xmlns:a14="http://schemas.microsoft.com/office/drawing/2010/main" w="9525">
+                <a14:hiddenLine xmlns:a14="http://schemas.microsoft.com/office/drawing/2010/main" xmlns="" w="9525">
                   <a:solidFill>
                     <a:srgbClr val="000000"/>
                   </a:solidFill>
@@ -2881,7 +2881,7 @@
             </a:ln>
             <a:extLst>
               <a:ext uri="{91240B29-F687-4f45-9708-019B960494DF}">
-                <a14:hiddenLine xmlns="" xmlns:a14="http://schemas.microsoft.com/office/drawing/2010/main" w="9525">
+                <a14:hiddenLine xmlns:a14="http://schemas.microsoft.com/office/drawing/2010/main" xmlns="" w="9525">
                   <a:solidFill>
                     <a:srgbClr val="000000"/>
                   </a:solidFill>
@@ -2943,7 +2943,7 @@
             </a:ln>
             <a:extLst>
               <a:ext uri="{91240B29-F687-4f45-9708-019B960494DF}">
-                <a14:hiddenLine xmlns="" xmlns:a14="http://schemas.microsoft.com/office/drawing/2010/main" w="9525">
+                <a14:hiddenLine xmlns:a14="http://schemas.microsoft.com/office/drawing/2010/main" xmlns="" w="9525">
                   <a:solidFill>
                     <a:srgbClr val="000000"/>
                   </a:solidFill>
@@ -3033,7 +3033,7 @@
             </a:ln>
             <a:extLst>
               <a:ext uri="{91240B29-F687-4f45-9708-019B960494DF}">
-                <a14:hiddenLine xmlns="" xmlns:a14="http://schemas.microsoft.com/office/drawing/2010/main" w="9525">
+                <a14:hiddenLine xmlns:a14="http://schemas.microsoft.com/office/drawing/2010/main" xmlns="" w="9525">
                   <a:solidFill>
                     <a:srgbClr val="000000"/>
                   </a:solidFill>
@@ -3095,7 +3095,7 @@
             </a:ln>
             <a:extLst>
               <a:ext uri="{91240B29-F687-4f45-9708-019B960494DF}">
-                <a14:hiddenLine xmlns="" xmlns:a14="http://schemas.microsoft.com/office/drawing/2010/main" w="9525">
+                <a14:hiddenLine xmlns:a14="http://schemas.microsoft.com/office/drawing/2010/main" xmlns="" w="9525">
                   <a:solidFill>
                     <a:srgbClr val="000000"/>
                   </a:solidFill>
@@ -3185,7 +3185,7 @@
             </a:ln>
             <a:extLst>
               <a:ext uri="{91240B29-F687-4f45-9708-019B960494DF}">
-                <a14:hiddenLine xmlns="" xmlns:a14="http://schemas.microsoft.com/office/drawing/2010/main" w="9525">
+                <a14:hiddenLine xmlns:a14="http://schemas.microsoft.com/office/drawing/2010/main" xmlns="" w="9525">
                   <a:solidFill>
                     <a:srgbClr val="000000"/>
                   </a:solidFill>
@@ -3219,7 +3219,7 @@
             </a:ln>
             <a:extLst>
               <a:ext uri="{91240B29-F687-4f45-9708-019B960494DF}">
-                <a14:hiddenLine xmlns="" xmlns:a14="http://schemas.microsoft.com/office/drawing/2010/main" w="9525">
+                <a14:hiddenLine xmlns:a14="http://schemas.microsoft.com/office/drawing/2010/main" xmlns="" w="9525">
                   <a:solidFill>
                     <a:srgbClr val="000000"/>
                   </a:solidFill>
@@ -3284,7 +3284,7 @@
             </a:ln>
             <a:extLst>
               <a:ext uri="{91240B29-F687-4f45-9708-019B960494DF}">
-                <a14:hiddenLine xmlns="" xmlns:a14="http://schemas.microsoft.com/office/drawing/2010/main" w="9525">
+                <a14:hiddenLine xmlns:a14="http://schemas.microsoft.com/office/drawing/2010/main" xmlns="" w="9525">
                   <a:solidFill>
                     <a:srgbClr val="000000"/>
                   </a:solidFill>
@@ -3374,7 +3374,7 @@
             </a:ln>
             <a:extLst>
               <a:ext uri="{91240B29-F687-4f45-9708-019B960494DF}">
-                <a14:hiddenLine xmlns="" xmlns:a14="http://schemas.microsoft.com/office/drawing/2010/main" w="9525">
+                <a14:hiddenLine xmlns:a14="http://schemas.microsoft.com/office/drawing/2010/main" xmlns="" w="9525">
                   <a:solidFill>
                     <a:srgbClr val="000000"/>
                   </a:solidFill>
@@ -3436,7 +3436,7 @@
             </a:ln>
             <a:extLst>
               <a:ext uri="{91240B29-F687-4f45-9708-019B960494DF}">
-                <a14:hiddenLine xmlns="" xmlns:a14="http://schemas.microsoft.com/office/drawing/2010/main" w="9525">
+                <a14:hiddenLine xmlns:a14="http://schemas.microsoft.com/office/drawing/2010/main" xmlns="" w="9525">
                   <a:solidFill>
                     <a:srgbClr val="000000"/>
                   </a:solidFill>
@@ -3526,7 +3526,7 @@
             </a:ln>
             <a:extLst>
               <a:ext uri="{91240B29-F687-4f45-9708-019B960494DF}">
-                <a14:hiddenLine xmlns="" xmlns:a14="http://schemas.microsoft.com/office/drawing/2010/main" w="9525">
+                <a14:hiddenLine xmlns:a14="http://schemas.microsoft.com/office/drawing/2010/main" xmlns="" w="9525">
                   <a:solidFill>
                     <a:srgbClr val="000000"/>
                   </a:solidFill>
@@ -3616,7 +3616,7 @@
             </a:ln>
             <a:extLst>
               <a:ext uri="{91240B29-F687-4f45-9708-019B960494DF}">
-                <a14:hiddenLine xmlns="" xmlns:a14="http://schemas.microsoft.com/office/drawing/2010/main" w="9525">
+                <a14:hiddenLine xmlns:a14="http://schemas.microsoft.com/office/drawing/2010/main" xmlns="" w="9525">
                   <a:solidFill>
                     <a:srgbClr val="000000"/>
                   </a:solidFill>
@@ -3681,7 +3681,7 @@
             </a:ln>
             <a:extLst>
               <a:ext uri="{91240B29-F687-4f45-9708-019B960494DF}">
-                <a14:hiddenLine xmlns="" xmlns:a14="http://schemas.microsoft.com/office/drawing/2010/main" w="9525">
+                <a14:hiddenLine xmlns:a14="http://schemas.microsoft.com/office/drawing/2010/main" xmlns="" w="9525">
                   <a:solidFill>
                     <a:srgbClr val="000000"/>
                   </a:solidFill>
@@ -3743,7 +3743,7 @@
             </a:ln>
             <a:extLst>
               <a:ext uri="{91240B29-F687-4f45-9708-019B960494DF}">
-                <a14:hiddenLine xmlns="" xmlns:a14="http://schemas.microsoft.com/office/drawing/2010/main" w="9525">
+                <a14:hiddenLine xmlns:a14="http://schemas.microsoft.com/office/drawing/2010/main" xmlns="" w="9525">
                   <a:solidFill>
                     <a:srgbClr val="000000"/>
                   </a:solidFill>
@@ -3833,7 +3833,7 @@
             </a:ln>
             <a:extLst>
               <a:ext uri="{91240B29-F687-4f45-9708-019B960494DF}">
-                <a14:hiddenLine xmlns="" xmlns:a14="http://schemas.microsoft.com/office/drawing/2010/main" w="9525">
+                <a14:hiddenLine xmlns:a14="http://schemas.microsoft.com/office/drawing/2010/main" xmlns="" w="9525">
                   <a:solidFill>
                     <a:srgbClr val="000000"/>
                   </a:solidFill>
@@ -3923,7 +3923,7 @@
             </a:ln>
             <a:extLst>
               <a:ext uri="{91240B29-F687-4f45-9708-019B960494DF}">
-                <a14:hiddenLine xmlns="" xmlns:a14="http://schemas.microsoft.com/office/drawing/2010/main" w="9525">
+                <a14:hiddenLine xmlns:a14="http://schemas.microsoft.com/office/drawing/2010/main" xmlns="" w="9525">
                   <a:solidFill>
                     <a:srgbClr val="000000"/>
                   </a:solidFill>
@@ -3985,7 +3985,7 @@
             </a:ln>
             <a:extLst>
               <a:ext uri="{91240B29-F687-4f45-9708-019B960494DF}">
-                <a14:hiddenLine xmlns="" xmlns:a14="http://schemas.microsoft.com/office/drawing/2010/main" w="9525">
+                <a14:hiddenLine xmlns:a14="http://schemas.microsoft.com/office/drawing/2010/main" xmlns="" w="9525">
                   <a:solidFill>
                     <a:srgbClr val="000000"/>
                   </a:solidFill>
@@ -4105,7 +4105,7 @@
             </a:ln>
             <a:extLst>
               <a:ext uri="{91240B29-F687-4f45-9708-019B960494DF}">
-                <a14:hiddenLine xmlns="" xmlns:a14="http://schemas.microsoft.com/office/drawing/2010/main" w="9525">
+                <a14:hiddenLine xmlns:a14="http://schemas.microsoft.com/office/drawing/2010/main" xmlns="" w="9525">
                   <a:solidFill>
                     <a:srgbClr val="000000"/>
                   </a:solidFill>
@@ -4173,7 +4173,7 @@
             </a:ln>
             <a:extLst>
               <a:ext uri="{91240B29-F687-4f45-9708-019B960494DF}">
-                <a14:hiddenLine xmlns="" xmlns:a14="http://schemas.microsoft.com/office/drawing/2010/main" w="9525">
+                <a14:hiddenLine xmlns:a14="http://schemas.microsoft.com/office/drawing/2010/main" xmlns="" w="9525">
                   <a:solidFill>
                     <a:srgbClr val="000000"/>
                   </a:solidFill>
@@ -4263,7 +4263,7 @@
             </a:ln>
             <a:extLst>
               <a:ext uri="{91240B29-F687-4f45-9708-019B960494DF}">
-                <a14:hiddenLine xmlns="" xmlns:a14="http://schemas.microsoft.com/office/drawing/2010/main" w="9525">
+                <a14:hiddenLine xmlns:a14="http://schemas.microsoft.com/office/drawing/2010/main" xmlns="" w="9525">
                   <a:solidFill>
                     <a:srgbClr val="000000"/>
                   </a:solidFill>
@@ -4403,7 +4403,7 @@
           <a:p>
             <a:fld id="{48A87A34-81AB-432B-8DAE-1953F412C126}" type="datetimeFigureOut">
               <a:rPr lang="en-US" dirty="0"/>
-              <a:t>9/30/2014</a:t>
+              <a:t>10/8/2014</a:t>
             </a:fld>
             <a:endParaRPr lang="en-US" dirty="0"/>
           </a:p>
@@ -4665,7 +4665,7 @@
           <a:p>
             <a:fld id="{48A87A34-81AB-432B-8DAE-1953F412C126}" type="datetimeFigureOut">
               <a:rPr lang="en-US" dirty="0"/>
-              <a:t>9/30/2014</a:t>
+              <a:t>10/8/2014</a:t>
             </a:fld>
             <a:endParaRPr lang="en-US" dirty="0"/>
           </a:p>
@@ -4856,7 +4856,7 @@
           <a:p>
             <a:fld id="{48A87A34-81AB-432B-8DAE-1953F412C126}" type="datetimeFigureOut">
               <a:rPr lang="en-US" dirty="0"/>
-              <a:t>9/30/2014</a:t>
+              <a:t>10/8/2014</a:t>
             </a:fld>
             <a:endParaRPr lang="en-US" dirty="0"/>
           </a:p>
@@ -5114,7 +5114,7 @@
           <a:p>
             <a:fld id="{48A87A34-81AB-432B-8DAE-1953F412C126}" type="datetimeFigureOut">
               <a:rPr lang="en-US" dirty="0"/>
-              <a:t>9/30/2014</a:t>
+              <a:t>10/8/2014</a:t>
             </a:fld>
             <a:endParaRPr lang="en-US" dirty="0"/>
           </a:p>
@@ -5543,7 +5543,7 @@
           <a:p>
             <a:fld id="{48A87A34-81AB-432B-8DAE-1953F412C126}" type="datetimeFigureOut">
               <a:rPr lang="en-US" dirty="0"/>
-              <a:t>9/30/2014</a:t>
+              <a:t>10/8/2014</a:t>
             </a:fld>
             <a:endParaRPr lang="en-US" dirty="0"/>
           </a:p>
@@ -6084,7 +6084,7 @@
           <a:p>
             <a:fld id="{48A87A34-81AB-432B-8DAE-1953F412C126}" type="datetimeFigureOut">
               <a:rPr lang="en-US" dirty="0"/>
-              <a:t>9/30/2014</a:t>
+              <a:t>10/8/2014</a:t>
             </a:fld>
             <a:endParaRPr lang="en-US" dirty="0"/>
           </a:p>
@@ -6799,7 +6799,7 @@
           <a:p>
             <a:fld id="{48A87A34-81AB-432B-8DAE-1953F412C126}" type="datetimeFigureOut">
               <a:rPr lang="en-US" dirty="0"/>
-              <a:t>9/30/2014</a:t>
+              <a:t>10/8/2014</a:t>
             </a:fld>
             <a:endParaRPr lang="en-US" dirty="0"/>
           </a:p>
@@ -6964,7 +6964,7 @@
           <a:p>
             <a:fld id="{48A87A34-81AB-432B-8DAE-1953F412C126}" type="datetimeFigureOut">
               <a:rPr lang="en-US" dirty="0"/>
-              <a:t>9/30/2014</a:t>
+              <a:t>10/8/2014</a:t>
             </a:fld>
             <a:endParaRPr lang="en-US" dirty="0"/>
           </a:p>
@@ -7139,7 +7139,7 @@
           <a:p>
             <a:fld id="{48A87A34-81AB-432B-8DAE-1953F412C126}" type="datetimeFigureOut">
               <a:rPr lang="en-US" dirty="0"/>
-              <a:t>9/30/2014</a:t>
+              <a:t>10/8/2014</a:t>
             </a:fld>
             <a:endParaRPr lang="en-US" dirty="0"/>
           </a:p>
@@ -7304,7 +7304,7 @@
           <a:p>
             <a:fld id="{48A87A34-81AB-432B-8DAE-1953F412C126}" type="datetimeFigureOut">
               <a:rPr lang="en-US" dirty="0"/>
-              <a:t>9/30/2014</a:t>
+              <a:t>10/8/2014</a:t>
             </a:fld>
             <a:endParaRPr lang="en-US" dirty="0"/>
           </a:p>
@@ -7549,7 +7549,7 @@
           <a:p>
             <a:fld id="{48A87A34-81AB-432B-8DAE-1953F412C126}" type="datetimeFigureOut">
               <a:rPr lang="en-US" dirty="0"/>
-              <a:t>9/30/2014</a:t>
+              <a:t>10/8/2014</a:t>
             </a:fld>
             <a:endParaRPr lang="en-US" dirty="0"/>
           </a:p>
@@ -7776,7 +7776,7 @@
           <a:p>
             <a:fld id="{48A87A34-81AB-432B-8DAE-1953F412C126}" type="datetimeFigureOut">
               <a:rPr lang="en-US" dirty="0"/>
-              <a:t>9/30/2014</a:t>
+              <a:t>10/8/2014</a:t>
             </a:fld>
             <a:endParaRPr lang="en-US" dirty="0"/>
           </a:p>
@@ -8152,7 +8152,7 @@
           <a:p>
             <a:fld id="{48A87A34-81AB-432B-8DAE-1953F412C126}" type="datetimeFigureOut">
               <a:rPr lang="en-US" dirty="0"/>
-              <a:t>9/30/2014</a:t>
+              <a:t>10/8/2014</a:t>
             </a:fld>
             <a:endParaRPr lang="en-US" dirty="0"/>
           </a:p>
@@ -8265,7 +8265,7 @@
           <a:p>
             <a:fld id="{48A87A34-81AB-432B-8DAE-1953F412C126}" type="datetimeFigureOut">
               <a:rPr lang="en-US" dirty="0"/>
-              <a:t>9/30/2014</a:t>
+              <a:t>10/8/2014</a:t>
             </a:fld>
             <a:endParaRPr lang="en-US" dirty="0"/>
           </a:p>
@@ -8355,7 +8355,7 @@
           <a:p>
             <a:fld id="{48A87A34-81AB-432B-8DAE-1953F412C126}" type="datetimeFigureOut">
               <a:rPr lang="en-US" dirty="0"/>
-              <a:t>9/30/2014</a:t>
+              <a:t>10/8/2014</a:t>
             </a:fld>
             <a:endParaRPr lang="en-US" dirty="0"/>
           </a:p>
@@ -8599,7 +8599,7 @@
           <a:p>
             <a:fld id="{48A87A34-81AB-432B-8DAE-1953F412C126}" type="datetimeFigureOut">
               <a:rPr lang="en-US" dirty="0"/>
-              <a:t>9/30/2014</a:t>
+              <a:t>10/8/2014</a:t>
             </a:fld>
             <a:endParaRPr lang="en-US" dirty="0"/>
           </a:p>
@@ -8874,7 +8874,7 @@
           <a:p>
             <a:fld id="{48A87A34-81AB-432B-8DAE-1953F412C126}" type="datetimeFigureOut">
               <a:rPr lang="en-US" dirty="0"/>
-              <a:t>9/30/2014</a:t>
+              <a:t>10/8/2014</a:t>
             </a:fld>
             <a:endParaRPr lang="en-US" dirty="0"/>
           </a:p>
@@ -8992,7 +8992,7 @@
           <a:noFill/>
           <a:extLst>
             <a:ext uri="{909E8E84-426E-40dd-AFC4-6F175D3DCCD1}">
-              <a14:hiddenFill xmlns="" xmlns:a14="http://schemas.microsoft.com/office/drawing/2010/main">
+              <a14:hiddenFill xmlns:a14="http://schemas.microsoft.com/office/drawing/2010/main" xmlns="">
                 <a:solidFill>
                   <a:srgbClr val="FFFFFF"/>
                 </a:solidFill>
@@ -9066,7 +9066,7 @@
               </a:ln>
               <a:extLst>
                 <a:ext uri="{91240B29-F687-4f45-9708-019B960494DF}">
-                  <a14:hiddenLine xmlns="" xmlns:a14="http://schemas.microsoft.com/office/drawing/2010/main" w="9525">
+                  <a14:hiddenLine xmlns:a14="http://schemas.microsoft.com/office/drawing/2010/main" xmlns="" w="9525">
                     <a:solidFill>
                       <a:srgbClr val="000000"/>
                     </a:solidFill>
@@ -9156,7 +9156,7 @@
               </a:ln>
               <a:extLst>
                 <a:ext uri="{91240B29-F687-4f45-9708-019B960494DF}">
-                  <a14:hiddenLine xmlns="" xmlns:a14="http://schemas.microsoft.com/office/drawing/2010/main" w="9525">
+                  <a14:hiddenLine xmlns:a14="http://schemas.microsoft.com/office/drawing/2010/main" xmlns="" w="9525">
                     <a:solidFill>
                       <a:srgbClr val="000000"/>
                     </a:solidFill>
@@ -9246,7 +9246,7 @@
               </a:ln>
               <a:extLst>
                 <a:ext uri="{91240B29-F687-4f45-9708-019B960494DF}">
-                  <a14:hiddenLine xmlns="" xmlns:a14="http://schemas.microsoft.com/office/drawing/2010/main" w="9525">
+                  <a14:hiddenLine xmlns:a14="http://schemas.microsoft.com/office/drawing/2010/main" xmlns="" w="9525">
                     <a:solidFill>
                       <a:srgbClr val="000000"/>
                     </a:solidFill>
@@ -9308,7 +9308,7 @@
               </a:ln>
               <a:extLst>
                 <a:ext uri="{91240B29-F687-4f45-9708-019B960494DF}">
-                  <a14:hiddenLine xmlns="" xmlns:a14="http://schemas.microsoft.com/office/drawing/2010/main" w="9525">
+                  <a14:hiddenLine xmlns:a14="http://schemas.microsoft.com/office/drawing/2010/main" xmlns="" w="9525">
                     <a:solidFill>
                       <a:srgbClr val="000000"/>
                     </a:solidFill>
@@ -9398,7 +9398,7 @@
               </a:ln>
               <a:extLst>
                 <a:ext uri="{91240B29-F687-4f45-9708-019B960494DF}">
-                  <a14:hiddenLine xmlns="" xmlns:a14="http://schemas.microsoft.com/office/drawing/2010/main" w="9525">
+                  <a14:hiddenLine xmlns:a14="http://schemas.microsoft.com/office/drawing/2010/main" xmlns="" w="9525">
                     <a:solidFill>
                       <a:srgbClr val="000000"/>
                     </a:solidFill>
@@ -9460,7 +9460,7 @@
               </a:ln>
               <a:extLst>
                 <a:ext uri="{91240B29-F687-4f45-9708-019B960494DF}">
-                  <a14:hiddenLine xmlns="" xmlns:a14="http://schemas.microsoft.com/office/drawing/2010/main" w="9525">
+                  <a14:hiddenLine xmlns:a14="http://schemas.microsoft.com/office/drawing/2010/main" xmlns="" w="9525">
                     <a:solidFill>
                       <a:srgbClr val="000000"/>
                     </a:solidFill>
@@ -9522,7 +9522,7 @@
               </a:ln>
               <a:extLst>
                 <a:ext uri="{91240B29-F687-4f45-9708-019B960494DF}">
-                  <a14:hiddenLine xmlns="" xmlns:a14="http://schemas.microsoft.com/office/drawing/2010/main" w="9525">
+                  <a14:hiddenLine xmlns:a14="http://schemas.microsoft.com/office/drawing/2010/main" xmlns="" w="9525">
                     <a:solidFill>
                       <a:srgbClr val="000000"/>
                     </a:solidFill>
@@ -9612,7 +9612,7 @@
               </a:ln>
               <a:extLst>
                 <a:ext uri="{91240B29-F687-4f45-9708-019B960494DF}">
-                  <a14:hiddenLine xmlns="" xmlns:a14="http://schemas.microsoft.com/office/drawing/2010/main" w="9525">
+                  <a14:hiddenLine xmlns:a14="http://schemas.microsoft.com/office/drawing/2010/main" xmlns="" w="9525">
                     <a:solidFill>
                       <a:srgbClr val="000000"/>
                     </a:solidFill>
@@ -9702,7 +9702,7 @@
               </a:ln>
               <a:extLst>
                 <a:ext uri="{91240B29-F687-4f45-9708-019B960494DF}">
-                  <a14:hiddenLine xmlns="" xmlns:a14="http://schemas.microsoft.com/office/drawing/2010/main" w="9525">
+                  <a14:hiddenLine xmlns:a14="http://schemas.microsoft.com/office/drawing/2010/main" xmlns="" w="9525">
                     <a:solidFill>
                       <a:srgbClr val="000000"/>
                     </a:solidFill>
@@ -9764,7 +9764,7 @@
               </a:ln>
               <a:extLst>
                 <a:ext uri="{91240B29-F687-4f45-9708-019B960494DF}">
-                  <a14:hiddenLine xmlns="" xmlns:a14="http://schemas.microsoft.com/office/drawing/2010/main" w="9525">
+                  <a14:hiddenLine xmlns:a14="http://schemas.microsoft.com/office/drawing/2010/main" xmlns="" w="9525">
                     <a:solidFill>
                       <a:srgbClr val="000000"/>
                     </a:solidFill>
@@ -9874,7 +9874,7 @@
               </a:ln>
               <a:extLst>
                 <a:ext uri="{91240B29-F687-4f45-9708-019B960494DF}">
-                  <a14:hiddenLine xmlns="" xmlns:a14="http://schemas.microsoft.com/office/drawing/2010/main" w="9525">
+                  <a14:hiddenLine xmlns:a14="http://schemas.microsoft.com/office/drawing/2010/main" xmlns="" w="9525">
                     <a:solidFill>
                       <a:srgbClr val="000000"/>
                     </a:solidFill>
@@ -9958,7 +9958,7 @@
               </a:ln>
               <a:extLst>
                 <a:ext uri="{91240B29-F687-4f45-9708-019B960494DF}">
-                  <a14:hiddenLine xmlns="" xmlns:a14="http://schemas.microsoft.com/office/drawing/2010/main" w="9525">
+                  <a14:hiddenLine xmlns:a14="http://schemas.microsoft.com/office/drawing/2010/main" xmlns="" w="9525">
                     <a:solidFill>
                       <a:srgbClr val="000000"/>
                     </a:solidFill>
@@ -10020,7 +10020,7 @@
               </a:ln>
               <a:extLst>
                 <a:ext uri="{91240B29-F687-4f45-9708-019B960494DF}">
-                  <a14:hiddenLine xmlns="" xmlns:a14="http://schemas.microsoft.com/office/drawing/2010/main" w="9525">
+                  <a14:hiddenLine xmlns:a14="http://schemas.microsoft.com/office/drawing/2010/main" xmlns="" w="9525">
                     <a:solidFill>
                       <a:srgbClr val="000000"/>
                     </a:solidFill>
@@ -10082,7 +10082,7 @@
               </a:ln>
               <a:extLst>
                 <a:ext uri="{91240B29-F687-4f45-9708-019B960494DF}">
-                  <a14:hiddenLine xmlns="" xmlns:a14="http://schemas.microsoft.com/office/drawing/2010/main" w="9525">
+                  <a14:hiddenLine xmlns:a14="http://schemas.microsoft.com/office/drawing/2010/main" xmlns="" w="9525">
                     <a:solidFill>
                       <a:srgbClr val="000000"/>
                     </a:solidFill>
@@ -10172,7 +10172,7 @@
               </a:ln>
               <a:extLst>
                 <a:ext uri="{91240B29-F687-4f45-9708-019B960494DF}">
-                  <a14:hiddenLine xmlns="" xmlns:a14="http://schemas.microsoft.com/office/drawing/2010/main" w="9525">
+                  <a14:hiddenLine xmlns:a14="http://schemas.microsoft.com/office/drawing/2010/main" xmlns="" w="9525">
                     <a:solidFill>
                       <a:srgbClr val="000000"/>
                     </a:solidFill>
@@ -10206,7 +10206,7 @@
               </a:ln>
               <a:extLst>
                 <a:ext uri="{91240B29-F687-4f45-9708-019B960494DF}">
-                  <a14:hiddenLine xmlns="" xmlns:a14="http://schemas.microsoft.com/office/drawing/2010/main" w="9525">
+                  <a14:hiddenLine xmlns:a14="http://schemas.microsoft.com/office/drawing/2010/main" xmlns="" w="9525">
                     <a:solidFill>
                       <a:srgbClr val="000000"/>
                     </a:solidFill>
@@ -10271,7 +10271,7 @@
               </a:ln>
               <a:extLst>
                 <a:ext uri="{91240B29-F687-4f45-9708-019B960494DF}">
-                  <a14:hiddenLine xmlns="" xmlns:a14="http://schemas.microsoft.com/office/drawing/2010/main" w="9525">
+                  <a14:hiddenLine xmlns:a14="http://schemas.microsoft.com/office/drawing/2010/main" xmlns="" w="9525">
                     <a:solidFill>
                       <a:srgbClr val="000000"/>
                     </a:solidFill>
@@ -10361,7 +10361,7 @@
               </a:ln>
               <a:extLst>
                 <a:ext uri="{91240B29-F687-4f45-9708-019B960494DF}">
-                  <a14:hiddenLine xmlns="" xmlns:a14="http://schemas.microsoft.com/office/drawing/2010/main" w="9525">
+                  <a14:hiddenLine xmlns:a14="http://schemas.microsoft.com/office/drawing/2010/main" xmlns="" w="9525">
                     <a:solidFill>
                       <a:srgbClr val="000000"/>
                     </a:solidFill>
@@ -10423,7 +10423,7 @@
               </a:ln>
               <a:extLst>
                 <a:ext uri="{91240B29-F687-4f45-9708-019B960494DF}">
-                  <a14:hiddenLine xmlns="" xmlns:a14="http://schemas.microsoft.com/office/drawing/2010/main" w="9525">
+                  <a14:hiddenLine xmlns:a14="http://schemas.microsoft.com/office/drawing/2010/main" xmlns="" w="9525">
                     <a:solidFill>
                       <a:srgbClr val="000000"/>
                     </a:solidFill>
@@ -10513,7 +10513,7 @@
               </a:ln>
               <a:extLst>
                 <a:ext uri="{91240B29-F687-4f45-9708-019B960494DF}">
-                  <a14:hiddenLine xmlns="" xmlns:a14="http://schemas.microsoft.com/office/drawing/2010/main" w="9525">
+                  <a14:hiddenLine xmlns:a14="http://schemas.microsoft.com/office/drawing/2010/main" xmlns="" w="9525">
                     <a:solidFill>
                       <a:srgbClr val="000000"/>
                     </a:solidFill>
@@ -10578,7 +10578,7 @@
               </a:ln>
               <a:extLst>
                 <a:ext uri="{91240B29-F687-4f45-9708-019B960494DF}">
-                  <a14:hiddenLine xmlns="" xmlns:a14="http://schemas.microsoft.com/office/drawing/2010/main" w="9525">
+                  <a14:hiddenLine xmlns:a14="http://schemas.microsoft.com/office/drawing/2010/main" xmlns="" w="9525">
                     <a:solidFill>
                       <a:srgbClr val="000000"/>
                     </a:solidFill>
@@ -10640,7 +10640,7 @@
               </a:ln>
               <a:extLst>
                 <a:ext uri="{91240B29-F687-4f45-9708-019B960494DF}">
-                  <a14:hiddenLine xmlns="" xmlns:a14="http://schemas.microsoft.com/office/drawing/2010/main" w="9525">
+                  <a14:hiddenLine xmlns:a14="http://schemas.microsoft.com/office/drawing/2010/main" xmlns="" w="9525">
                     <a:solidFill>
                       <a:srgbClr val="000000"/>
                     </a:solidFill>
@@ -10730,7 +10730,7 @@
               </a:ln>
               <a:extLst>
                 <a:ext uri="{91240B29-F687-4f45-9708-019B960494DF}">
-                  <a14:hiddenLine xmlns="" xmlns:a14="http://schemas.microsoft.com/office/drawing/2010/main" w="9525">
+                  <a14:hiddenLine xmlns:a14="http://schemas.microsoft.com/office/drawing/2010/main" xmlns="" w="9525">
                     <a:solidFill>
                       <a:srgbClr val="000000"/>
                     </a:solidFill>
@@ -10820,7 +10820,7 @@
               </a:ln>
               <a:extLst>
                 <a:ext uri="{91240B29-F687-4f45-9708-019B960494DF}">
-                  <a14:hiddenLine xmlns="" xmlns:a14="http://schemas.microsoft.com/office/drawing/2010/main" w="9525">
+                  <a14:hiddenLine xmlns:a14="http://schemas.microsoft.com/office/drawing/2010/main" xmlns="" w="9525">
                     <a:solidFill>
                       <a:srgbClr val="000000"/>
                     </a:solidFill>
@@ -10885,7 +10885,7 @@
               </a:ln>
               <a:extLst>
                 <a:ext uri="{91240B29-F687-4f45-9708-019B960494DF}">
-                  <a14:hiddenLine xmlns="" xmlns:a14="http://schemas.microsoft.com/office/drawing/2010/main" w="9525">
+                  <a14:hiddenLine xmlns:a14="http://schemas.microsoft.com/office/drawing/2010/main" xmlns="" w="9525">
                     <a:solidFill>
                       <a:srgbClr val="000000"/>
                     </a:solidFill>
@@ -11005,7 +11005,7 @@
               </a:ln>
               <a:extLst>
                 <a:ext uri="{91240B29-F687-4f45-9708-019B960494DF}">
-                  <a14:hiddenLine xmlns="" xmlns:a14="http://schemas.microsoft.com/office/drawing/2010/main" w="9525">
+                  <a14:hiddenLine xmlns:a14="http://schemas.microsoft.com/office/drawing/2010/main" xmlns="" w="9525">
                     <a:solidFill>
                       <a:srgbClr val="000000"/>
                     </a:solidFill>
@@ -11086,7 +11086,7 @@
               </a:ln>
               <a:extLst>
                 <a:ext uri="{91240B29-F687-4f45-9708-019B960494DF}">
-                  <a14:hiddenLine xmlns="" xmlns:a14="http://schemas.microsoft.com/office/drawing/2010/main" w="9525">
+                  <a14:hiddenLine xmlns:a14="http://schemas.microsoft.com/office/drawing/2010/main" xmlns="" w="9525">
                     <a:solidFill>
                       <a:srgbClr val="000000"/>
                     </a:solidFill>
@@ -11201,7 +11201,7 @@
               </a:ln>
               <a:extLst>
                 <a:ext uri="{91240B29-F687-4f45-9708-019B960494DF}">
-                  <a14:hiddenLine xmlns="" xmlns:a14="http://schemas.microsoft.com/office/drawing/2010/main" w="9525">
+                  <a14:hiddenLine xmlns:a14="http://schemas.microsoft.com/office/drawing/2010/main" xmlns="" w="9525">
                     <a:solidFill>
                       <a:srgbClr val="000000"/>
                     </a:solidFill>
@@ -11291,7 +11291,7 @@
               </a:ln>
               <a:extLst>
                 <a:ext uri="{91240B29-F687-4f45-9708-019B960494DF}">
-                  <a14:hiddenLine xmlns="" xmlns:a14="http://schemas.microsoft.com/office/drawing/2010/main" w="9525">
+                  <a14:hiddenLine xmlns:a14="http://schemas.microsoft.com/office/drawing/2010/main" xmlns="" w="9525">
                     <a:solidFill>
                       <a:srgbClr val="000000"/>
                     </a:solidFill>
@@ -11356,7 +11356,7 @@
               </a:ln>
               <a:extLst>
                 <a:ext uri="{91240B29-F687-4f45-9708-019B960494DF}">
-                  <a14:hiddenLine xmlns="" xmlns:a14="http://schemas.microsoft.com/office/drawing/2010/main" w="9525">
+                  <a14:hiddenLine xmlns:a14="http://schemas.microsoft.com/office/drawing/2010/main" xmlns="" w="9525">
                     <a:solidFill>
                       <a:srgbClr val="000000"/>
                     </a:solidFill>
@@ -11446,7 +11446,7 @@
               </a:ln>
               <a:extLst>
                 <a:ext uri="{91240B29-F687-4f45-9708-019B960494DF}">
-                  <a14:hiddenLine xmlns="" xmlns:a14="http://schemas.microsoft.com/office/drawing/2010/main" w="9525">
+                  <a14:hiddenLine xmlns:a14="http://schemas.microsoft.com/office/drawing/2010/main" xmlns="" w="9525">
                     <a:solidFill>
                       <a:srgbClr val="000000"/>
                     </a:solidFill>
@@ -11514,7 +11514,7 @@
               </a:ln>
               <a:extLst>
                 <a:ext uri="{91240B29-F687-4f45-9708-019B960494DF}">
-                  <a14:hiddenLine xmlns="" xmlns:a14="http://schemas.microsoft.com/office/drawing/2010/main" w="9525">
+                  <a14:hiddenLine xmlns:a14="http://schemas.microsoft.com/office/drawing/2010/main" xmlns="" w="9525">
                     <a:solidFill>
                       <a:srgbClr val="000000"/>
                     </a:solidFill>
@@ -11604,7 +11604,7 @@
               </a:ln>
               <a:extLst>
                 <a:ext uri="{91240B29-F687-4f45-9708-019B960494DF}">
-                  <a14:hiddenLine xmlns="" xmlns:a14="http://schemas.microsoft.com/office/drawing/2010/main" w="9525">
+                  <a14:hiddenLine xmlns:a14="http://schemas.microsoft.com/office/drawing/2010/main" xmlns="" w="9525">
                     <a:solidFill>
                       <a:srgbClr val="000000"/>
                     </a:solidFill>
@@ -11672,7 +11672,7 @@
               </a:ln>
               <a:extLst>
                 <a:ext uri="{91240B29-F687-4f45-9708-019B960494DF}">
-                  <a14:hiddenLine xmlns="" xmlns:a14="http://schemas.microsoft.com/office/drawing/2010/main" w="9525">
+                  <a14:hiddenLine xmlns:a14="http://schemas.microsoft.com/office/drawing/2010/main" xmlns="" w="9525">
                     <a:solidFill>
                       <a:srgbClr val="000000"/>
                     </a:solidFill>
@@ -11762,7 +11762,7 @@
               </a:ln>
               <a:extLst>
                 <a:ext uri="{91240B29-F687-4f45-9708-019B960494DF}">
-                  <a14:hiddenLine xmlns="" xmlns:a14="http://schemas.microsoft.com/office/drawing/2010/main" w="9525">
+                  <a14:hiddenLine xmlns:a14="http://schemas.microsoft.com/office/drawing/2010/main" xmlns="" w="9525">
                     <a:solidFill>
                       <a:srgbClr val="000000"/>
                     </a:solidFill>
@@ -11796,7 +11796,7 @@
               </a:ln>
               <a:extLst>
                 <a:ext uri="{91240B29-F687-4f45-9708-019B960494DF}">
-                  <a14:hiddenLine xmlns="" xmlns:a14="http://schemas.microsoft.com/office/drawing/2010/main" w="9525">
+                  <a14:hiddenLine xmlns:a14="http://schemas.microsoft.com/office/drawing/2010/main" xmlns="" w="9525">
                     <a:solidFill>
                       <a:srgbClr val="000000"/>
                     </a:solidFill>
@@ -11937,7 +11937,7 @@
             <a:fld id="{48A87A34-81AB-432B-8DAE-1953F412C126}" type="datetimeFigureOut">
               <a:rPr lang="en-US" dirty="0"/>
               <a:pPr/>
-              <a:t>9/30/2014</a:t>
+              <a:t>10/8/2014</a:t>
             </a:fld>
             <a:endParaRPr lang="en-US" dirty="0"/>
           </a:p>
@@ -12417,7 +12417,6 @@
               <a:rPr lang="en-US" dirty="0" smtClean="0"/>
               <a:t> technologies</a:t>
             </a:r>
-            <a:endParaRPr lang="en-US" dirty="0" smtClean="0"/>
           </a:p>
         </p:txBody>
       </p:sp>
@@ -12635,7 +12634,24 @@
               <a:rPr lang="en-US" dirty="0" smtClean="0">
                 <a:hlinkClick r:id="rId4"/>
               </a:rPr>
-              <a:t>Automation Station</a:t>
+              <a:t>http://blog.qawarrior.com/</a:t>
+            </a:r>
+            <a:endParaRPr lang="en-US" dirty="0" smtClean="0"/>
+          </a:p>
+          <a:p>
+            <a:r>
+              <a:rPr lang="en-US" dirty="0" err="1" smtClean="0"/>
+              <a:t>Github</a:t>
+            </a:r>
+            <a:r>
+              <a:rPr lang="en-US" dirty="0" smtClean="0"/>
+              <a:t> </a:t>
+            </a:r>
+            <a:r>
+              <a:rPr lang="en-US" dirty="0" smtClean="0">
+                <a:hlinkClick r:id="rId5"/>
+              </a:rPr>
+              <a:t>https://github.com/qawarrior</a:t>
             </a:r>
             <a:endParaRPr lang="en-US" dirty="0"/>
           </a:p>
@@ -12700,15 +12716,11 @@
           <a:p>
             <a:r>
               <a:rPr lang="en-US" dirty="0" smtClean="0"/>
-              <a:t>What is this </a:t>
+              <a:t>Overview of </a:t>
             </a:r>
             <a:r>
               <a:rPr lang="en-US" dirty="0" err="1" smtClean="0"/>
               <a:t>powershell</a:t>
-            </a:r>
-            <a:r>
-              <a:rPr lang="en-US" dirty="0" smtClean="0"/>
-              <a:t> you speak of</a:t>
             </a:r>
             <a:endParaRPr lang="en-US" dirty="0"/>
           </a:p>
@@ -12876,11 +12888,7 @@
           <a:p>
             <a:r>
               <a:rPr lang="en-US" dirty="0" smtClean="0"/>
-              <a:t>Most Commands </a:t>
-            </a:r>
-            <a:r>
-              <a:rPr lang="en-US" dirty="0" smtClean="0"/>
-              <a:t>that have a </a:t>
+              <a:t>Most Commands that have a </a:t>
             </a:r>
             <a:r>
               <a:rPr lang="en-US" dirty="0" err="1" smtClean="0"/>
@@ -13140,8 +13148,13 @@
             </a:r>
             <a:r>
               <a:rPr lang="en-US" dirty="0" smtClean="0"/>
-              <a:t> is ran in process</a:t>
-            </a:r>
+              <a:t> is </a:t>
+            </a:r>
+            <a:r>
+              <a:rPr lang="en-US" dirty="0" smtClean="0"/>
+              <a:t>an in process execution.</a:t>
+            </a:r>
+            <a:endParaRPr lang="en-US" dirty="0" smtClean="0"/>
           </a:p>
           <a:p>
             <a:r>
@@ -13154,7 +13167,6 @@
               <a:rPr lang="en-US" dirty="0" smtClean="0"/>
               <a:t>Live Objects are returned</a:t>
             </a:r>
-            <a:endParaRPr lang="en-US" dirty="0" smtClean="0"/>
           </a:p>
         </p:txBody>
       </p:sp>

</xml_diff>